<commit_message>
modified:   Diagrama.pptx 	modified:   Figuras/Diagrama AonNode.png 	new file:   Figuras/Diagrama AonNodelast.png 	new file:   Figuras/GanntDiagram2.png 	new file:   Figuras/GanntDiagramGdP.png 	new file:   Figuras/GanntDiagramGdP3.png 	new file:   Figuras/kkk.png 	modified:   charter.pdf 	modified:   charter.tex
</commit_message>
<xml_diff>
--- a/Diagrama.pptx
+++ b/Diagrama.pptx
@@ -105,6 +105,11 @@
       </a:defRPr>
     </a:lvl9pPr>
   </p:defaultTextStyle>
+  <p:extLst>
+    <p:ext uri="{EFAFB233-063F-42B5-8137-9DF3F51BA10A}">
+      <p15:sldGuideLst xmlns:p15="http://schemas.microsoft.com/office/powerpoint/2012/main"/>
+    </p:ext>
+  </p:extLst>
 </p:presentation>
 </file>
 
@@ -4590,54 +4595,13 @@
         </p:nvCxnSpPr>
         <p:spPr>
           <a:xfrm>
-            <a:off x="2868624" y="1425484"/>
+            <a:off x="2858795" y="2380363"/>
             <a:ext cx="356794" cy="1"/>
           </a:xfrm>
           <a:prstGeom prst="straightConnector1">
             <a:avLst/>
           </a:prstGeom>
           <a:ln w="19050">
-            <a:tailEnd type="triangle"/>
-          </a:ln>
-        </p:spPr>
-        <p:style>
-          <a:lnRef idx="1">
-            <a:schemeClr val="dk1"/>
-          </a:lnRef>
-          <a:fillRef idx="0">
-            <a:schemeClr val="dk1"/>
-          </a:fillRef>
-          <a:effectRef idx="0">
-            <a:schemeClr val="dk1"/>
-          </a:effectRef>
-          <a:fontRef idx="minor">
-            <a:schemeClr val="tx1"/>
-          </a:fontRef>
-        </p:style>
-      </p:cxnSp>
-      <p:cxnSp>
-        <p:nvCxnSpPr>
-          <p:cNvPr id="36" name="Straight Arrow Connector 35">
-            <a:extLst>
-              <a:ext uri="{FF2B5EF4-FFF2-40B4-BE49-F238E27FC236}">
-                <a16:creationId xmlns:a16="http://schemas.microsoft.com/office/drawing/2014/main" id="{8925E086-4E8B-8A8B-B82B-CD016FCF2535}"/>
-              </a:ext>
-            </a:extLst>
-          </p:cNvPr>
-          <p:cNvCxnSpPr>
-            <a:cxnSpLocks/>
-          </p:cNvCxnSpPr>
-          <p:nvPr/>
-        </p:nvCxnSpPr>
-        <p:spPr>
-          <a:xfrm>
-            <a:off x="3037129" y="2372459"/>
-            <a:ext cx="188289" cy="0"/>
-          </a:xfrm>
-          <a:prstGeom prst="straightConnector1">
-            <a:avLst/>
-          </a:prstGeom>
-          <a:ln>
             <a:tailEnd type="triangle"/>
           </a:ln>
         </p:spPr>
@@ -4672,134 +4636,13 @@
         </p:nvCxnSpPr>
         <p:spPr>
           <a:xfrm>
-            <a:off x="3037128" y="478509"/>
-            <a:ext cx="188289" cy="0"/>
+            <a:off x="2983041" y="478509"/>
+            <a:ext cx="242376" cy="0"/>
           </a:xfrm>
           <a:prstGeom prst="straightConnector1">
             <a:avLst/>
           </a:prstGeom>
           <a:ln>
-            <a:tailEnd type="triangle"/>
-          </a:ln>
-        </p:spPr>
-        <p:style>
-          <a:lnRef idx="1">
-            <a:schemeClr val="dk1"/>
-          </a:lnRef>
-          <a:fillRef idx="0">
-            <a:schemeClr val="dk1"/>
-          </a:fillRef>
-          <a:effectRef idx="0">
-            <a:schemeClr val="dk1"/>
-          </a:effectRef>
-          <a:fontRef idx="minor">
-            <a:schemeClr val="tx1"/>
-          </a:fontRef>
-        </p:style>
-      </p:cxnSp>
-      <p:cxnSp>
-        <p:nvCxnSpPr>
-          <p:cNvPr id="40" name="Straight Connector 39">
-            <a:extLst>
-              <a:ext uri="{FF2B5EF4-FFF2-40B4-BE49-F238E27FC236}">
-                <a16:creationId xmlns:a16="http://schemas.microsoft.com/office/drawing/2014/main" id="{4DFD81A8-342B-C97E-63BF-F2737004E57D}"/>
-              </a:ext>
-            </a:extLst>
-          </p:cNvPr>
-          <p:cNvCxnSpPr>
-            <a:cxnSpLocks/>
-          </p:cNvCxnSpPr>
-          <p:nvPr/>
-        </p:nvCxnSpPr>
-        <p:spPr>
-          <a:xfrm>
-            <a:off x="3037129" y="478509"/>
-            <a:ext cx="0" cy="946972"/>
-          </a:xfrm>
-          <a:prstGeom prst="line">
-            <a:avLst/>
-          </a:prstGeom>
-        </p:spPr>
-        <p:style>
-          <a:lnRef idx="1">
-            <a:schemeClr val="dk1"/>
-          </a:lnRef>
-          <a:fillRef idx="0">
-            <a:schemeClr val="dk1"/>
-          </a:fillRef>
-          <a:effectRef idx="0">
-            <a:schemeClr val="dk1"/>
-          </a:effectRef>
-          <a:fontRef idx="minor">
-            <a:schemeClr val="tx1"/>
-          </a:fontRef>
-        </p:style>
-      </p:cxnSp>
-      <p:cxnSp>
-        <p:nvCxnSpPr>
-          <p:cNvPr id="43" name="Straight Arrow Connector 42">
-            <a:extLst>
-              <a:ext uri="{FF2B5EF4-FFF2-40B4-BE49-F238E27FC236}">
-                <a16:creationId xmlns:a16="http://schemas.microsoft.com/office/drawing/2014/main" id="{0C59DC2D-C808-DDB2-9E3F-1036450AEAAB}"/>
-              </a:ext>
-            </a:extLst>
-          </p:cNvPr>
-          <p:cNvCxnSpPr>
-            <a:cxnSpLocks/>
-            <a:endCxn id="9" idx="1"/>
-          </p:cNvCxnSpPr>
-          <p:nvPr/>
-        </p:nvCxnSpPr>
-        <p:spPr>
-          <a:xfrm>
-            <a:off x="4291427" y="1425483"/>
-            <a:ext cx="305350" cy="1"/>
-          </a:xfrm>
-          <a:prstGeom prst="straightConnector1">
-            <a:avLst/>
-          </a:prstGeom>
-          <a:ln w="19050">
-            <a:tailEnd type="triangle"/>
-          </a:ln>
-        </p:spPr>
-        <p:style>
-          <a:lnRef idx="1">
-            <a:schemeClr val="dk1"/>
-          </a:lnRef>
-          <a:fillRef idx="0">
-            <a:schemeClr val="dk1"/>
-          </a:fillRef>
-          <a:effectRef idx="0">
-            <a:schemeClr val="dk1"/>
-          </a:effectRef>
-          <a:fontRef idx="minor">
-            <a:schemeClr val="tx1"/>
-          </a:fontRef>
-        </p:style>
-      </p:cxnSp>
-      <p:cxnSp>
-        <p:nvCxnSpPr>
-          <p:cNvPr id="45" name="Straight Arrow Connector 44">
-            <a:extLst>
-              <a:ext uri="{FF2B5EF4-FFF2-40B4-BE49-F238E27FC236}">
-                <a16:creationId xmlns:a16="http://schemas.microsoft.com/office/drawing/2014/main" id="{EB2B380A-1E05-8576-4F74-DB34975862A9}"/>
-              </a:ext>
-            </a:extLst>
-          </p:cNvPr>
-          <p:cNvCxnSpPr>
-            <a:cxnSpLocks/>
-          </p:cNvCxnSpPr>
-          <p:nvPr/>
-        </p:nvCxnSpPr>
-        <p:spPr>
-          <a:xfrm>
-            <a:off x="5762075" y="1425482"/>
-            <a:ext cx="305350" cy="1"/>
-          </a:xfrm>
-          <a:prstGeom prst="straightConnector1">
-            <a:avLst/>
-          </a:prstGeom>
-          <a:ln w="19050">
             <a:tailEnd type="triangle"/>
           </a:ln>
         </p:spPr>
@@ -4917,6 +4760,7 @@
           <a:prstGeom prst="line">
             <a:avLst/>
           </a:prstGeom>
+          <a:ln w="19050"/>
         </p:spPr>
         <p:style>
           <a:lnRef idx="1">
@@ -4955,6 +4799,7 @@
           <a:prstGeom prst="line">
             <a:avLst/>
           </a:prstGeom>
+          <a:ln w="19050"/>
         </p:spPr>
         <p:style>
           <a:lnRef idx="1">
@@ -5266,44 +5111,6 @@
           <a:xfrm>
             <a:off x="5902734" y="471454"/>
             <a:ext cx="2187" cy="954027"/>
-          </a:xfrm>
-          <a:prstGeom prst="line">
-            <a:avLst/>
-          </a:prstGeom>
-        </p:spPr>
-        <p:style>
-          <a:lnRef idx="1">
-            <a:schemeClr val="dk1"/>
-          </a:lnRef>
-          <a:fillRef idx="0">
-            <a:schemeClr val="dk1"/>
-          </a:fillRef>
-          <a:effectRef idx="0">
-            <a:schemeClr val="dk1"/>
-          </a:effectRef>
-          <a:fontRef idx="minor">
-            <a:schemeClr val="tx1"/>
-          </a:fontRef>
-        </p:style>
-      </p:cxnSp>
-      <p:cxnSp>
-        <p:nvCxnSpPr>
-          <p:cNvPr id="82" name="Straight Connector 81">
-            <a:extLst>
-              <a:ext uri="{FF2B5EF4-FFF2-40B4-BE49-F238E27FC236}">
-                <a16:creationId xmlns:a16="http://schemas.microsoft.com/office/drawing/2014/main" id="{26C276F3-6370-1175-C2A3-C451D0BB521D}"/>
-              </a:ext>
-            </a:extLst>
-          </p:cNvPr>
-          <p:cNvCxnSpPr>
-            <a:cxnSpLocks/>
-          </p:cNvCxnSpPr>
-          <p:nvPr/>
-        </p:nvCxnSpPr>
-        <p:spPr>
-          <a:xfrm>
-            <a:off x="3037128" y="1425481"/>
-            <a:ext cx="0" cy="946972"/>
           </a:xfrm>
           <a:prstGeom prst="line">
             <a:avLst/>
@@ -7443,6 +7250,321 @@
           <a:xfrm>
             <a:off x="3148449" y="4490205"/>
             <a:ext cx="0" cy="310486"/>
+          </a:xfrm>
+          <a:prstGeom prst="line">
+            <a:avLst/>
+          </a:prstGeom>
+        </p:spPr>
+        <p:style>
+          <a:lnRef idx="1">
+            <a:schemeClr val="dk1"/>
+          </a:lnRef>
+          <a:fillRef idx="0">
+            <a:schemeClr val="dk1"/>
+          </a:fillRef>
+          <a:effectRef idx="0">
+            <a:schemeClr val="dk1"/>
+          </a:effectRef>
+          <a:fontRef idx="minor">
+            <a:schemeClr val="tx1"/>
+          </a:fontRef>
+        </p:style>
+      </p:cxnSp>
+      <p:cxnSp>
+        <p:nvCxnSpPr>
+          <p:cNvPr id="2" name="Straight Connector 1">
+            <a:extLst>
+              <a:ext uri="{FF2B5EF4-FFF2-40B4-BE49-F238E27FC236}">
+                <a16:creationId xmlns:a16="http://schemas.microsoft.com/office/drawing/2014/main" id="{1765C3D9-3567-546C-F193-E1241273C339}"/>
+              </a:ext>
+            </a:extLst>
+          </p:cNvPr>
+          <p:cNvCxnSpPr>
+            <a:cxnSpLocks/>
+          </p:cNvCxnSpPr>
+          <p:nvPr/>
+        </p:nvCxnSpPr>
+        <p:spPr>
+          <a:xfrm>
+            <a:off x="1367781" y="132263"/>
+            <a:ext cx="0" cy="946972"/>
+          </a:xfrm>
+          <a:prstGeom prst="line">
+            <a:avLst/>
+          </a:prstGeom>
+        </p:spPr>
+        <p:style>
+          <a:lnRef idx="1">
+            <a:schemeClr val="dk1"/>
+          </a:lnRef>
+          <a:fillRef idx="0">
+            <a:schemeClr val="dk1"/>
+          </a:fillRef>
+          <a:effectRef idx="0">
+            <a:schemeClr val="dk1"/>
+          </a:effectRef>
+          <a:fontRef idx="minor">
+            <a:schemeClr val="tx1"/>
+          </a:fontRef>
+        </p:style>
+      </p:cxnSp>
+      <p:cxnSp>
+        <p:nvCxnSpPr>
+          <p:cNvPr id="3" name="Straight Connector 2">
+            <a:extLst>
+              <a:ext uri="{FF2B5EF4-FFF2-40B4-BE49-F238E27FC236}">
+                <a16:creationId xmlns:a16="http://schemas.microsoft.com/office/drawing/2014/main" id="{8FDD23DD-A0A6-60EE-C7D8-4D78B397376B}"/>
+              </a:ext>
+            </a:extLst>
+          </p:cNvPr>
+          <p:cNvCxnSpPr>
+            <a:cxnSpLocks/>
+          </p:cNvCxnSpPr>
+          <p:nvPr/>
+        </p:nvCxnSpPr>
+        <p:spPr>
+          <a:xfrm flipV="1">
+            <a:off x="1369547" y="139089"/>
+            <a:ext cx="1613494" cy="1"/>
+          </a:xfrm>
+          <a:prstGeom prst="line">
+            <a:avLst/>
+          </a:prstGeom>
+        </p:spPr>
+        <p:style>
+          <a:lnRef idx="1">
+            <a:schemeClr val="dk1"/>
+          </a:lnRef>
+          <a:fillRef idx="0">
+            <a:schemeClr val="dk1"/>
+          </a:fillRef>
+          <a:effectRef idx="0">
+            <a:schemeClr val="dk1"/>
+          </a:effectRef>
+          <a:fontRef idx="minor">
+            <a:schemeClr val="tx1"/>
+          </a:fontRef>
+        </p:style>
+      </p:cxnSp>
+      <p:cxnSp>
+        <p:nvCxnSpPr>
+          <p:cNvPr id="11" name="Straight Connector 10">
+            <a:extLst>
+              <a:ext uri="{FF2B5EF4-FFF2-40B4-BE49-F238E27FC236}">
+                <a16:creationId xmlns:a16="http://schemas.microsoft.com/office/drawing/2014/main" id="{568E9837-F824-585D-A3B5-3447D5631B15}"/>
+              </a:ext>
+            </a:extLst>
+          </p:cNvPr>
+          <p:cNvCxnSpPr>
+            <a:cxnSpLocks/>
+          </p:cNvCxnSpPr>
+          <p:nvPr/>
+        </p:nvCxnSpPr>
+        <p:spPr>
+          <a:xfrm flipH="1">
+            <a:off x="2983041" y="132263"/>
+            <a:ext cx="4118" cy="346246"/>
+          </a:xfrm>
+          <a:prstGeom prst="line">
+            <a:avLst/>
+          </a:prstGeom>
+        </p:spPr>
+        <p:style>
+          <a:lnRef idx="1">
+            <a:schemeClr val="dk1"/>
+          </a:lnRef>
+          <a:fillRef idx="0">
+            <a:schemeClr val="dk1"/>
+          </a:fillRef>
+          <a:effectRef idx="0">
+            <a:schemeClr val="dk1"/>
+          </a:effectRef>
+          <a:fontRef idx="minor">
+            <a:schemeClr val="tx1"/>
+          </a:fontRef>
+        </p:style>
+      </p:cxnSp>
+      <p:cxnSp>
+        <p:nvCxnSpPr>
+          <p:cNvPr id="12" name="Straight Connector 11">
+            <a:extLst>
+              <a:ext uri="{FF2B5EF4-FFF2-40B4-BE49-F238E27FC236}">
+                <a16:creationId xmlns:a16="http://schemas.microsoft.com/office/drawing/2014/main" id="{B20351FD-4BB7-27F6-0E8E-B3A91AB377B7}"/>
+              </a:ext>
+            </a:extLst>
+          </p:cNvPr>
+          <p:cNvCxnSpPr>
+            <a:cxnSpLocks/>
+          </p:cNvCxnSpPr>
+          <p:nvPr/>
+        </p:nvCxnSpPr>
+        <p:spPr>
+          <a:xfrm>
+            <a:off x="2983041" y="461455"/>
+            <a:ext cx="0" cy="946972"/>
+          </a:xfrm>
+          <a:prstGeom prst="line">
+            <a:avLst/>
+          </a:prstGeom>
+        </p:spPr>
+        <p:style>
+          <a:lnRef idx="1">
+            <a:schemeClr val="dk1"/>
+          </a:lnRef>
+          <a:fillRef idx="0">
+            <a:schemeClr val="dk1"/>
+          </a:fillRef>
+          <a:effectRef idx="0">
+            <a:schemeClr val="dk1"/>
+          </a:effectRef>
+          <a:fontRef idx="minor">
+            <a:schemeClr val="tx1"/>
+          </a:fontRef>
+        </p:style>
+      </p:cxnSp>
+      <p:cxnSp>
+        <p:nvCxnSpPr>
+          <p:cNvPr id="15" name="Straight Arrow Connector 14">
+            <a:extLst>
+              <a:ext uri="{FF2B5EF4-FFF2-40B4-BE49-F238E27FC236}">
+                <a16:creationId xmlns:a16="http://schemas.microsoft.com/office/drawing/2014/main" id="{E5E365D9-A424-25E5-FEBB-4476824F1D8C}"/>
+              </a:ext>
+            </a:extLst>
+          </p:cNvPr>
+          <p:cNvCxnSpPr>
+            <a:cxnSpLocks/>
+          </p:cNvCxnSpPr>
+          <p:nvPr/>
+        </p:nvCxnSpPr>
+        <p:spPr>
+          <a:xfrm>
+            <a:off x="2973213" y="1408427"/>
+            <a:ext cx="242376" cy="0"/>
+          </a:xfrm>
+          <a:prstGeom prst="straightConnector1">
+            <a:avLst/>
+          </a:prstGeom>
+          <a:ln>
+            <a:tailEnd type="triangle"/>
+          </a:ln>
+        </p:spPr>
+        <p:style>
+          <a:lnRef idx="1">
+            <a:schemeClr val="dk1"/>
+          </a:lnRef>
+          <a:fillRef idx="0">
+            <a:schemeClr val="dk1"/>
+          </a:fillRef>
+          <a:effectRef idx="0">
+            <a:schemeClr val="dk1"/>
+          </a:effectRef>
+          <a:fontRef idx="minor">
+            <a:schemeClr val="tx1"/>
+          </a:fontRef>
+        </p:style>
+      </p:cxnSp>
+      <p:cxnSp>
+        <p:nvCxnSpPr>
+          <p:cNvPr id="19" name="Straight Arrow Connector 18">
+            <a:extLst>
+              <a:ext uri="{FF2B5EF4-FFF2-40B4-BE49-F238E27FC236}">
+                <a16:creationId xmlns:a16="http://schemas.microsoft.com/office/drawing/2014/main" id="{08396878-E231-679B-47B1-27CA6935D08F}"/>
+              </a:ext>
+            </a:extLst>
+          </p:cNvPr>
+          <p:cNvCxnSpPr>
+            <a:cxnSpLocks/>
+            <a:endCxn id="9" idx="1"/>
+          </p:cNvCxnSpPr>
+          <p:nvPr/>
+        </p:nvCxnSpPr>
+        <p:spPr>
+          <a:xfrm flipV="1">
+            <a:off x="4291427" y="1425484"/>
+            <a:ext cx="305350" cy="4250"/>
+          </a:xfrm>
+          <a:prstGeom prst="straightConnector1">
+            <a:avLst/>
+          </a:prstGeom>
+          <a:ln>
+            <a:tailEnd type="triangle"/>
+          </a:ln>
+        </p:spPr>
+        <p:style>
+          <a:lnRef idx="1">
+            <a:schemeClr val="dk1"/>
+          </a:lnRef>
+          <a:fillRef idx="0">
+            <a:schemeClr val="dk1"/>
+          </a:fillRef>
+          <a:effectRef idx="0">
+            <a:schemeClr val="dk1"/>
+          </a:effectRef>
+          <a:fontRef idx="minor">
+            <a:schemeClr val="tx1"/>
+          </a:fontRef>
+        </p:style>
+      </p:cxnSp>
+      <p:cxnSp>
+        <p:nvCxnSpPr>
+          <p:cNvPr id="23" name="Straight Arrow Connector 22">
+            <a:extLst>
+              <a:ext uri="{FF2B5EF4-FFF2-40B4-BE49-F238E27FC236}">
+                <a16:creationId xmlns:a16="http://schemas.microsoft.com/office/drawing/2014/main" id="{D0FE54B6-8E3F-0F0D-E8AE-E645F0565D44}"/>
+              </a:ext>
+            </a:extLst>
+          </p:cNvPr>
+          <p:cNvCxnSpPr>
+            <a:cxnSpLocks/>
+            <a:endCxn id="13" idx="1"/>
+          </p:cNvCxnSpPr>
+          <p:nvPr/>
+        </p:nvCxnSpPr>
+        <p:spPr>
+          <a:xfrm flipV="1">
+            <a:off x="5914991" y="1425483"/>
+            <a:ext cx="152434" cy="7052"/>
+          </a:xfrm>
+          <a:prstGeom prst="straightConnector1">
+            <a:avLst/>
+          </a:prstGeom>
+          <a:ln w="19050">
+            <a:tailEnd type="triangle"/>
+          </a:ln>
+        </p:spPr>
+        <p:style>
+          <a:lnRef idx="1">
+            <a:schemeClr val="dk1"/>
+          </a:lnRef>
+          <a:fillRef idx="0">
+            <a:schemeClr val="dk1"/>
+          </a:fillRef>
+          <a:effectRef idx="0">
+            <a:schemeClr val="dk1"/>
+          </a:effectRef>
+          <a:fontRef idx="minor">
+            <a:schemeClr val="tx1"/>
+          </a:fontRef>
+        </p:style>
+      </p:cxnSp>
+      <p:cxnSp>
+        <p:nvCxnSpPr>
+          <p:cNvPr id="37" name="Straight Connector 36">
+            <a:extLst>
+              <a:ext uri="{FF2B5EF4-FFF2-40B4-BE49-F238E27FC236}">
+                <a16:creationId xmlns:a16="http://schemas.microsoft.com/office/drawing/2014/main" id="{423F3F46-D1DD-D25E-3A98-ADA2B546E413}"/>
+              </a:ext>
+            </a:extLst>
+          </p:cNvPr>
+          <p:cNvCxnSpPr>
+            <a:cxnSpLocks/>
+          </p:cNvCxnSpPr>
+          <p:nvPr/>
+        </p:nvCxnSpPr>
+        <p:spPr>
+          <a:xfrm>
+            <a:off x="5771020" y="1425481"/>
+            <a:ext cx="143971" cy="0"/>
           </a:xfrm>
           <a:prstGeom prst="line">
             <a:avLst/>

</xml_diff>